<commit_message>
new point coordinates added
</commit_message>
<xml_diff>
--- a/examples/utqiavik/data/labels/labels.pptx
+++ b/examples/utqiavik/data/labels/labels.pptx
@@ -8149,7 +8149,7 @@
         </p:nvSpPr>
         <p:spPr>
           <a:xfrm>
-            <a:off x="5553063" y="240837"/>
+            <a:off x="5641553" y="152344"/>
             <a:ext cx="336550" cy="261610"/>
           </a:xfrm>
           <a:prstGeom prst="rect">
@@ -10730,7 +10730,7 @@
                   <a:srgbClr val="C00000"/>
                 </a:solidFill>
               </a:rPr>
-              <a:t>163</a:t>
+              <a:t>179</a:t>
             </a:r>
           </a:p>
         </p:txBody>

</xml_diff>